<commit_message>
Update git branch flow chart.
</commit_message>
<xml_diff>
--- a/git/git.pptx
+++ b/git/git.pptx
@@ -4119,85 +4119,90 @@
               </a:rPr>
               <a:t>git stash</a:t>
             </a:r>
+            <a:endParaRPr lang="zh-CN" altLang="en-US">
+              <a:sym typeface="+mn-ea"/>
+            </a:endParaRPr>
+          </a:p>
+        </p:txBody>
+      </p:sp>
+      <p:sp>
+        <p:nvSpPr>
+          <p:cNvPr id="4" name="文本框 3"/>
+          <p:cNvSpPr txBox="1"/>
+          <p:nvPr/>
+        </p:nvSpPr>
+        <p:spPr>
+          <a:xfrm>
+            <a:off x="4198620" y="1825625"/>
+            <a:ext cx="4396740" cy="1314450"/>
+          </a:xfrm>
+          <a:prstGeom prst="rect">
+            <a:avLst/>
+          </a:prstGeom>
+          <a:noFill/>
+        </p:spPr>
+        <p:txBody>
+          <a:bodyPr wrap="square" rtlCol="0" anchor="t">
+            <a:spAutoFit/>
+          </a:bodyPr>
+          <a:p>
+            <a:pPr marL="457200" indent="-457200" algn="l">
+              <a:buFont typeface="Arial" panose="020B0604020202020204" pitchFamily="34" charset="0"/>
+              <a:buChar char="•"/>
+            </a:pPr>
+            <a:r>
+              <a:rPr lang="en-US" altLang="zh-CN" sz="2800">
+                <a:sym typeface="+mn-ea"/>
+              </a:rPr>
+              <a:t>利用分支进行开发流程</a:t>
+            </a:r>
+            <a:endParaRPr lang="en-US" altLang="zh-CN" sz="2800">
+              <a:sym typeface="+mn-ea"/>
+            </a:endParaRPr>
+          </a:p>
+          <a:p>
+            <a:pPr marL="685800" lvl="1" indent="-228600" algn="l">
+              <a:lnSpc>
+                <a:spcPct val="90000"/>
+              </a:lnSpc>
+              <a:spcBef>
+                <a:spcPts val="500"/>
+              </a:spcBef>
+              <a:buFont typeface="Arial" panose="020B0604020202020204" pitchFamily="34" charset="0"/>
+            </a:pPr>
+            <a:r>
+              <a:rPr lang="en-US" altLang="zh-CN" sz="2400">
+                <a:sym typeface="+mn-ea"/>
+              </a:rPr>
+              <a:t>长期分支</a:t>
+            </a:r>
             <a:endParaRPr lang="en-US" altLang="zh-CN" sz="2400">
               <a:sym typeface="+mn-ea"/>
             </a:endParaRPr>
           </a:p>
           <a:p>
-            <a:endParaRPr lang="en-US" altLang="zh-CN">
-              <a:sym typeface="+mn-ea"/>
-            </a:endParaRPr>
-          </a:p>
-          <a:p>
-            <a:r>
-              <a:rPr lang="zh-CN" altLang="en-US">
+            <a:pPr marL="685800" lvl="1" indent="-228600" algn="l">
+              <a:lnSpc>
+                <a:spcPct val="90000"/>
+              </a:lnSpc>
+              <a:spcBef>
+                <a:spcPts val="500"/>
+              </a:spcBef>
+              <a:buFont typeface="Arial" panose="020B0604020202020204" pitchFamily="34" charset="0"/>
+            </a:pPr>
+            <a:r>
+              <a:rPr lang="en-US" altLang="zh-CN" sz="2400">
                 <a:sym typeface="+mn-ea"/>
               </a:rPr>
-              <a:t>利用分支进行开发流程</a:t>
-            </a:r>
-            <a:endParaRPr lang="zh-CN" altLang="en-US">
-              <a:sym typeface="+mn-ea"/>
-            </a:endParaRPr>
-          </a:p>
-          <a:p>
-            <a:pPr lvl="1"/>
-            <a:r>
-              <a:rPr lang="zh-CN" altLang="en-US">
-                <a:sym typeface="+mn-ea"/>
-              </a:rPr>
-              <a:t>长期分支</a:t>
-            </a:r>
-            <a:endParaRPr lang="en-US" altLang="zh-CN">
-              <a:sym typeface="+mn-ea"/>
-            </a:endParaRPr>
-          </a:p>
-          <a:p>
-            <a:pPr lvl="1"/>
-            <a:r>
-              <a:rPr lang="en-US" altLang="zh-CN">
-                <a:sym typeface="+mn-ea"/>
-              </a:rPr>
-              <a:t>bug </a:t>
-            </a:r>
-            <a:r>
-              <a:rPr lang="zh-CN" altLang="en-US">
-                <a:sym typeface="+mn-ea"/>
-              </a:rPr>
-              <a:t>分支</a:t>
-            </a:r>
-            <a:endParaRPr lang="zh-CN" altLang="en-US">
-              <a:sym typeface="+mn-ea"/>
-            </a:endParaRPr>
-          </a:p>
-          <a:p>
-            <a:pPr lvl="1"/>
-            <a:r>
-              <a:rPr lang="en-US" altLang="zh-CN">
-                <a:sym typeface="+mn-ea"/>
-              </a:rPr>
-              <a:t>feature </a:t>
-            </a:r>
-            <a:r>
-              <a:rPr lang="zh-CN" altLang="en-US">
-                <a:sym typeface="+mn-ea"/>
-              </a:rPr>
-              <a:t>分支</a:t>
-            </a:r>
-            <a:endParaRPr lang="zh-CN" altLang="en-US">
-              <a:sym typeface="+mn-ea"/>
-            </a:endParaRPr>
-          </a:p>
-          <a:p>
-            <a:pPr lvl="1"/>
-            <a:endParaRPr lang="zh-CN" altLang="en-US">
-              <a:sym typeface="+mn-ea"/>
-            </a:endParaRPr>
+              <a:t>feature 分支</a:t>
+            </a:r>
+            <a:endParaRPr lang="en-US" altLang="zh-CN" sz="2400"/>
           </a:p>
         </p:txBody>
       </p:sp>
       <p:pic>
         <p:nvPicPr>
-          <p:cNvPr id="3" name="图片 2"/>
+          <p:cNvPr id="5" name="图片 4" descr="166109-588644ba9ef509bc"/>
           <p:cNvPicPr>
             <a:picLocks noChangeAspect="1"/>
           </p:cNvPicPr>
@@ -4211,8 +4216,8 @@
         </p:blipFill>
         <p:spPr>
           <a:xfrm>
-            <a:off x="3531235" y="3922395"/>
-            <a:ext cx="4629785" cy="2664460"/>
+            <a:off x="679450" y="3140710"/>
+            <a:ext cx="7785735" cy="3673475"/>
           </a:xfrm>
           <a:prstGeom prst="rect">
             <a:avLst/>

</xml_diff>

<commit_message>
Added some pictures in git.pptx file.
</commit_message>
<xml_diff>
--- a/git/git.pptx
+++ b/git/git.pptx
@@ -19,11 +19,12 @@
     <p:sldId id="270" r:id="rId14"/>
     <p:sldId id="272" r:id="rId15"/>
     <p:sldId id="273" r:id="rId16"/>
-    <p:sldId id="257" r:id="rId17"/>
-    <p:sldId id="279" r:id="rId18"/>
-    <p:sldId id="278" r:id="rId19"/>
-    <p:sldId id="275" r:id="rId20"/>
-    <p:sldId id="271" r:id="rId21"/>
+    <p:sldId id="283" r:id="rId17"/>
+    <p:sldId id="257" r:id="rId18"/>
+    <p:sldId id="279" r:id="rId19"/>
+    <p:sldId id="278" r:id="rId20"/>
+    <p:sldId id="275" r:id="rId21"/>
+    <p:sldId id="271" r:id="rId22"/>
   </p:sldIdLst>
   <p:sldSz cx="9144000" cy="6858000" type="screen4x3"/>
   <p:notesSz cx="6858000" cy="9144000"/>
@@ -3269,6 +3270,141 @@
           </a:p>
         </p:txBody>
       </p:sp>
+      <p:grpSp>
+        <p:nvGrpSpPr>
+          <p:cNvPr id="11" name="组合 10"/>
+          <p:cNvGrpSpPr/>
+          <p:nvPr/>
+        </p:nvGrpSpPr>
+        <p:grpSpPr>
+          <a:xfrm>
+            <a:off x="3603625" y="3291840"/>
+            <a:ext cx="4585335" cy="2964815"/>
+            <a:chOff x="6371" y="5223"/>
+            <a:chExt cx="6561" cy="4505"/>
+          </a:xfrm>
+        </p:grpSpPr>
+        <p:pic>
+          <p:nvPicPr>
+            <p:cNvPr id="3" name="图片 2"/>
+            <p:cNvPicPr>
+              <a:picLocks noChangeAspect="1"/>
+            </p:cNvPicPr>
+            <p:nvPr/>
+          </p:nvPicPr>
+          <p:blipFill>
+            <a:blip r:embed="rId1"/>
+            <a:stretch>
+              <a:fillRect/>
+            </a:stretch>
+          </p:blipFill>
+          <p:spPr>
+            <a:xfrm>
+              <a:off x="6371" y="5223"/>
+              <a:ext cx="2039" cy="2061"/>
+            </a:xfrm>
+            <a:prstGeom prst="rect">
+              <a:avLst/>
+            </a:prstGeom>
+          </p:spPr>
+        </p:pic>
+        <p:pic>
+          <p:nvPicPr>
+            <p:cNvPr id="4" name="图片 3"/>
+            <p:cNvPicPr>
+              <a:picLocks noChangeAspect="1"/>
+            </p:cNvPicPr>
+            <p:nvPr/>
+          </p:nvPicPr>
+          <p:blipFill>
+            <a:blip r:embed="rId2"/>
+            <a:stretch>
+              <a:fillRect/>
+            </a:stretch>
+          </p:blipFill>
+          <p:spPr>
+            <a:xfrm>
+              <a:off x="8652" y="5242"/>
+              <a:ext cx="1983" cy="2118"/>
+            </a:xfrm>
+            <a:prstGeom prst="rect">
+              <a:avLst/>
+            </a:prstGeom>
+          </p:spPr>
+        </p:pic>
+        <p:pic>
+          <p:nvPicPr>
+            <p:cNvPr id="5" name="图片 4"/>
+            <p:cNvPicPr>
+              <a:picLocks noChangeAspect="1"/>
+            </p:cNvPicPr>
+            <p:nvPr/>
+          </p:nvPicPr>
+          <p:blipFill>
+            <a:blip r:embed="rId3"/>
+            <a:stretch>
+              <a:fillRect/>
+            </a:stretch>
+          </p:blipFill>
+          <p:spPr>
+            <a:xfrm>
+              <a:off x="10894" y="5260"/>
+              <a:ext cx="2039" cy="2024"/>
+            </a:xfrm>
+            <a:prstGeom prst="rect">
+              <a:avLst/>
+            </a:prstGeom>
+          </p:spPr>
+        </p:pic>
+        <p:pic>
+          <p:nvPicPr>
+            <p:cNvPr id="7" name="图片 6"/>
+            <p:cNvPicPr>
+              <a:picLocks noChangeAspect="1"/>
+            </p:cNvPicPr>
+            <p:nvPr/>
+          </p:nvPicPr>
+          <p:blipFill>
+            <a:blip r:embed="rId4"/>
+            <a:stretch>
+              <a:fillRect/>
+            </a:stretch>
+          </p:blipFill>
+          <p:spPr>
+            <a:xfrm>
+              <a:off x="7445" y="7629"/>
+              <a:ext cx="2057" cy="2061"/>
+            </a:xfrm>
+            <a:prstGeom prst="rect">
+              <a:avLst/>
+            </a:prstGeom>
+          </p:spPr>
+        </p:pic>
+        <p:pic>
+          <p:nvPicPr>
+            <p:cNvPr id="8" name="图片 7"/>
+            <p:cNvPicPr>
+              <a:picLocks noChangeAspect="1"/>
+            </p:cNvPicPr>
+            <p:nvPr/>
+          </p:nvPicPr>
+          <p:blipFill>
+            <a:blip r:embed="rId5"/>
+            <a:stretch>
+              <a:fillRect/>
+            </a:stretch>
+          </p:blipFill>
+          <p:spPr>
+            <a:xfrm>
+              <a:off x="9724" y="7592"/>
+              <a:ext cx="2057" cy="2136"/>
+            </a:xfrm>
+            <a:prstGeom prst="rect">
+              <a:avLst/>
+            </a:prstGeom>
+          </p:spPr>
+        </p:pic>
+      </p:grpSp>
     </p:spTree>
   </p:cSld>
   <p:clrMapOvr>
@@ -4567,6 +4703,343 @@
         <p:nvPr/>
       </p:nvGrpSpPr>
       <p:grpSpPr/>
+      <p:sp>
+        <p:nvSpPr>
+          <p:cNvPr id="2" name="标题 1"/>
+          <p:cNvSpPr>
+            <a:spLocks noGrp="1"/>
+          </p:cNvSpPr>
+          <p:nvPr>
+            <p:ph type="title"/>
+          </p:nvPr>
+        </p:nvSpPr>
+        <p:spPr/>
+        <p:txBody>
+          <a:bodyPr/>
+          <a:p>
+            <a:r>
+              <a:rPr lang="zh-CN" altLang="en-US"/>
+              <a:t>图形工具</a:t>
+            </a:r>
+            <a:endParaRPr lang="zh-CN" altLang="en-US"/>
+          </a:p>
+        </p:txBody>
+      </p:sp>
+      <p:sp>
+        <p:nvSpPr>
+          <p:cNvPr id="6" name="内容占位符 2"/>
+          <p:cNvSpPr>
+            <a:spLocks noGrp="1"/>
+          </p:cNvSpPr>
+          <p:nvPr/>
+        </p:nvSpPr>
+        <p:spPr>
+          <a:xfrm>
+            <a:off x="628650" y="1825625"/>
+            <a:ext cx="7886065" cy="4351655"/>
+          </a:xfrm>
+          <a:prstGeom prst="rect">
+            <a:avLst/>
+          </a:prstGeom>
+        </p:spPr>
+        <p:txBody>
+          <a:bodyPr vert="horz" lIns="91440" tIns="45720" rIns="91440" bIns="45720" rtlCol="0">
+            <a:normAutofit/>
+          </a:bodyPr>
+          <a:lstStyle>
+            <a:lvl1pPr marL="228600" indent="-228600" algn="l" defTabSz="914400" rtl="0" eaLnBrk="1" latinLnBrk="0" hangingPunct="1">
+              <a:lnSpc>
+                <a:spcPct val="90000"/>
+              </a:lnSpc>
+              <a:spcBef>
+                <a:spcPts val="1000"/>
+              </a:spcBef>
+              <a:buFont typeface="Arial" panose="020B0604020202020204" pitchFamily="34" charset="0"/>
+              <a:buChar char="•"/>
+              <a:defRPr sz="2800" kern="1200">
+                <a:solidFill>
+                  <a:schemeClr val="tx1"/>
+                </a:solidFill>
+                <a:latin typeface="+mn-lt"/>
+                <a:ea typeface="+mn-ea"/>
+                <a:cs typeface="+mn-cs"/>
+              </a:defRPr>
+            </a:lvl1pPr>
+            <a:lvl2pPr marL="685800" indent="-228600" algn="l" defTabSz="914400" rtl="0" eaLnBrk="1" latinLnBrk="0" hangingPunct="1">
+              <a:lnSpc>
+                <a:spcPct val="90000"/>
+              </a:lnSpc>
+              <a:spcBef>
+                <a:spcPts val="500"/>
+              </a:spcBef>
+              <a:buFont typeface="Arial" panose="020B0604020202020204" pitchFamily="34" charset="0"/>
+              <a:buChar char="•"/>
+              <a:defRPr sz="2400" kern="1200">
+                <a:solidFill>
+                  <a:schemeClr val="tx1"/>
+                </a:solidFill>
+                <a:latin typeface="+mn-lt"/>
+                <a:ea typeface="+mn-ea"/>
+                <a:cs typeface="+mn-cs"/>
+              </a:defRPr>
+            </a:lvl2pPr>
+            <a:lvl3pPr marL="1143000" indent="-228600" algn="l" defTabSz="914400" rtl="0" eaLnBrk="1" latinLnBrk="0" hangingPunct="1">
+              <a:lnSpc>
+                <a:spcPct val="90000"/>
+              </a:lnSpc>
+              <a:spcBef>
+                <a:spcPts val="500"/>
+              </a:spcBef>
+              <a:buFont typeface="Arial" panose="020B0604020202020204" pitchFamily="34" charset="0"/>
+              <a:buChar char="•"/>
+              <a:defRPr sz="2000" kern="1200">
+                <a:solidFill>
+                  <a:schemeClr val="tx1"/>
+                </a:solidFill>
+                <a:latin typeface="+mn-lt"/>
+                <a:ea typeface="+mn-ea"/>
+                <a:cs typeface="+mn-cs"/>
+              </a:defRPr>
+            </a:lvl3pPr>
+            <a:lvl4pPr marL="1600200" indent="-228600" algn="l" defTabSz="914400" rtl="0" eaLnBrk="1" latinLnBrk="0" hangingPunct="1">
+              <a:lnSpc>
+                <a:spcPct val="90000"/>
+              </a:lnSpc>
+              <a:spcBef>
+                <a:spcPts val="500"/>
+              </a:spcBef>
+              <a:buFont typeface="Arial" panose="020B0604020202020204" pitchFamily="34" charset="0"/>
+              <a:buChar char="•"/>
+              <a:defRPr sz="1800" kern="1200">
+                <a:solidFill>
+                  <a:schemeClr val="tx1"/>
+                </a:solidFill>
+                <a:latin typeface="+mn-lt"/>
+                <a:ea typeface="+mn-ea"/>
+                <a:cs typeface="+mn-cs"/>
+              </a:defRPr>
+            </a:lvl4pPr>
+            <a:lvl5pPr marL="2057400" indent="-228600" algn="l" defTabSz="914400" rtl="0" eaLnBrk="1" latinLnBrk="0" hangingPunct="1">
+              <a:lnSpc>
+                <a:spcPct val="90000"/>
+              </a:lnSpc>
+              <a:spcBef>
+                <a:spcPts val="500"/>
+              </a:spcBef>
+              <a:buFont typeface="Arial" panose="020B0604020202020204" pitchFamily="34" charset="0"/>
+              <a:buChar char="•"/>
+              <a:defRPr sz="1800" kern="1200">
+                <a:solidFill>
+                  <a:schemeClr val="tx1"/>
+                </a:solidFill>
+                <a:latin typeface="+mn-lt"/>
+                <a:ea typeface="+mn-ea"/>
+                <a:cs typeface="+mn-cs"/>
+              </a:defRPr>
+            </a:lvl5pPr>
+            <a:lvl6pPr marL="2514600" indent="-228600" algn="l" defTabSz="914400" rtl="0" eaLnBrk="1" latinLnBrk="0" hangingPunct="1">
+              <a:lnSpc>
+                <a:spcPct val="90000"/>
+              </a:lnSpc>
+              <a:spcBef>
+                <a:spcPts val="500"/>
+              </a:spcBef>
+              <a:buFont typeface="Arial" panose="020B0604020202020204" pitchFamily="34" charset="0"/>
+              <a:buChar char="•"/>
+              <a:defRPr sz="1800" kern="1200">
+                <a:solidFill>
+                  <a:schemeClr val="tx1"/>
+                </a:solidFill>
+                <a:latin typeface="+mn-lt"/>
+                <a:ea typeface="+mn-ea"/>
+                <a:cs typeface="+mn-cs"/>
+              </a:defRPr>
+            </a:lvl6pPr>
+            <a:lvl7pPr marL="2971800" indent="-228600" algn="l" defTabSz="914400" rtl="0" eaLnBrk="1" latinLnBrk="0" hangingPunct="1">
+              <a:lnSpc>
+                <a:spcPct val="90000"/>
+              </a:lnSpc>
+              <a:spcBef>
+                <a:spcPts val="500"/>
+              </a:spcBef>
+              <a:buFont typeface="Arial" panose="020B0604020202020204" pitchFamily="34" charset="0"/>
+              <a:buChar char="•"/>
+              <a:defRPr sz="1800" kern="1200">
+                <a:solidFill>
+                  <a:schemeClr val="tx1"/>
+                </a:solidFill>
+                <a:latin typeface="+mn-lt"/>
+                <a:ea typeface="+mn-ea"/>
+                <a:cs typeface="+mn-cs"/>
+              </a:defRPr>
+            </a:lvl7pPr>
+            <a:lvl8pPr marL="3429000" indent="-228600" algn="l" defTabSz="914400" rtl="0" eaLnBrk="1" latinLnBrk="0" hangingPunct="1">
+              <a:lnSpc>
+                <a:spcPct val="90000"/>
+              </a:lnSpc>
+              <a:spcBef>
+                <a:spcPts val="500"/>
+              </a:spcBef>
+              <a:buFont typeface="Arial" panose="020B0604020202020204" pitchFamily="34" charset="0"/>
+              <a:buChar char="•"/>
+              <a:defRPr sz="1800" kern="1200">
+                <a:solidFill>
+                  <a:schemeClr val="tx1"/>
+                </a:solidFill>
+                <a:latin typeface="+mn-lt"/>
+                <a:ea typeface="+mn-ea"/>
+                <a:cs typeface="+mn-cs"/>
+              </a:defRPr>
+            </a:lvl8pPr>
+            <a:lvl9pPr marL="3886200" indent="-228600" algn="l" defTabSz="914400" rtl="0" eaLnBrk="1" latinLnBrk="0" hangingPunct="1">
+              <a:lnSpc>
+                <a:spcPct val="90000"/>
+              </a:lnSpc>
+              <a:spcBef>
+                <a:spcPts val="500"/>
+              </a:spcBef>
+              <a:buFont typeface="Arial" panose="020B0604020202020204" pitchFamily="34" charset="0"/>
+              <a:buChar char="•"/>
+              <a:defRPr sz="1800" kern="1200">
+                <a:solidFill>
+                  <a:schemeClr val="tx1"/>
+                </a:solidFill>
+                <a:latin typeface="+mn-lt"/>
+                <a:ea typeface="+mn-ea"/>
+                <a:cs typeface="+mn-cs"/>
+              </a:defRPr>
+            </a:lvl9pPr>
+          </a:lstStyle>
+          <a:p>
+            <a:r>
+              <a:rPr lang="en-US" altLang="zh-CN">
+                <a:sym typeface="+mn-ea"/>
+              </a:rPr>
+              <a:t>gitk</a:t>
+            </a:r>
+            <a:endParaRPr lang="en-US" altLang="zh-CN">
+              <a:sym typeface="+mn-ea"/>
+            </a:endParaRPr>
+          </a:p>
+          <a:p>
+            <a:pPr lvl="1"/>
+            <a:r>
+              <a:rPr lang="en-US" altLang="zh-CN">
+                <a:sym typeface="+mn-ea"/>
+              </a:rPr>
+              <a:t>Tcl/Tk </a:t>
+            </a:r>
+            <a:r>
+              <a:rPr lang="zh-CN" altLang="en-US">
+                <a:sym typeface="+mn-ea"/>
+              </a:rPr>
+              <a:t>开发</a:t>
+            </a:r>
+            <a:endParaRPr lang="zh-CN" altLang="en-US">
+              <a:sym typeface="+mn-ea"/>
+            </a:endParaRPr>
+          </a:p>
+          <a:p>
+            <a:r>
+              <a:rPr lang="en-US" altLang="zh-CN">
+                <a:sym typeface="+mn-ea"/>
+              </a:rPr>
+              <a:t>gitg</a:t>
+            </a:r>
+            <a:endParaRPr lang="en-US" altLang="zh-CN">
+              <a:sym typeface="+mn-ea"/>
+            </a:endParaRPr>
+          </a:p>
+          <a:p>
+            <a:pPr lvl="1"/>
+            <a:r>
+              <a:rPr lang="zh-CN" altLang="en-US">
+                <a:sym typeface="+mn-ea"/>
+              </a:rPr>
+              <a:t>使用</a:t>
+            </a:r>
+            <a:r>
+              <a:rPr lang="en-US" altLang="zh-CN">
+                <a:sym typeface="+mn-ea"/>
+              </a:rPr>
+              <a:t>GTK+</a:t>
+            </a:r>
+            <a:r>
+              <a:rPr lang="zh-CN" altLang="en-US">
+                <a:sym typeface="+mn-ea"/>
+              </a:rPr>
+              <a:t>实现</a:t>
+            </a:r>
+            <a:endParaRPr lang="zh-CN" altLang="en-US">
+              <a:sym typeface="+mn-ea"/>
+            </a:endParaRPr>
+          </a:p>
+          <a:p>
+            <a:r>
+              <a:rPr lang="en-US" altLang="zh-CN">
+                <a:sym typeface="+mn-ea"/>
+              </a:rPr>
+              <a:t>qgit</a:t>
+            </a:r>
+            <a:endParaRPr lang="en-US" altLang="zh-CN">
+              <a:sym typeface="+mn-ea"/>
+            </a:endParaRPr>
+          </a:p>
+          <a:p>
+            <a:pPr lvl="1"/>
+            <a:r>
+              <a:rPr lang="zh-CN" altLang="en-US">
+                <a:sym typeface="+mn-ea"/>
+              </a:rPr>
+              <a:t>使用</a:t>
+            </a:r>
+            <a:r>
+              <a:rPr lang="en-US" altLang="zh-CN">
+                <a:sym typeface="+mn-ea"/>
+              </a:rPr>
+              <a:t>Qt</a:t>
+            </a:r>
+            <a:r>
+              <a:rPr lang="zh-CN" altLang="en-US">
+                <a:sym typeface="+mn-ea"/>
+              </a:rPr>
+              <a:t>实现</a:t>
+            </a:r>
+            <a:endParaRPr lang="zh-CN" altLang="en-US">
+              <a:sym typeface="+mn-ea"/>
+            </a:endParaRPr>
+          </a:p>
+          <a:p>
+            <a:endParaRPr lang="zh-CN" altLang="en-US">
+              <a:sym typeface="+mn-ea"/>
+            </a:endParaRPr>
+          </a:p>
+          <a:p>
+            <a:pPr lvl="1"/>
+            <a:endParaRPr lang="zh-CN" altLang="en-US">
+              <a:sym typeface="+mn-ea"/>
+            </a:endParaRPr>
+          </a:p>
+        </p:txBody>
+      </p:sp>
+    </p:spTree>
+  </p:cSld>
+  <p:clrMapOvr>
+    <a:masterClrMapping/>
+  </p:clrMapOvr>
+</p:sld>
+</file>
+
+<file path=ppt/slides/slide16.xml><?xml version="1.0" encoding="utf-8"?>
+<p:sld xmlns:a="http://schemas.openxmlformats.org/drawingml/2006/main" xmlns:r="http://schemas.openxmlformats.org/officeDocument/2006/relationships" xmlns:p="http://schemas.openxmlformats.org/presentationml/2006/main">
+  <p:cSld>
+    <p:spTree>
+      <p:nvGrpSpPr>
+        <p:cNvPr id="1" name=""/>
+        <p:cNvGrpSpPr/>
+        <p:nvPr/>
+      </p:nvGrpSpPr>
+      <p:grpSpPr/>
       <p:pic>
         <p:nvPicPr>
           <p:cNvPr id="2" name="图片 1" descr="github"/>
@@ -4599,7 +5072,7 @@
 </p:sld>
 </file>
 
-<file path=ppt/slides/slide16.xml><?xml version="1.0" encoding="utf-8"?>
+<file path=ppt/slides/slide17.xml><?xml version="1.0" encoding="utf-8"?>
 <p:sld xmlns:a="http://schemas.openxmlformats.org/drawingml/2006/main" xmlns:r="http://schemas.openxmlformats.org/officeDocument/2006/relationships" xmlns:p="http://schemas.openxmlformats.org/presentationml/2006/main">
   <p:cSld>
     <p:spTree>
@@ -4922,7 +5395,7 @@
 </p:sld>
 </file>
 
-<file path=ppt/slides/slide17.xml><?xml version="1.0" encoding="utf-8"?>
+<file path=ppt/slides/slide18.xml><?xml version="1.0" encoding="utf-8"?>
 <p:sld xmlns:a="http://schemas.openxmlformats.org/drawingml/2006/main" xmlns:r="http://schemas.openxmlformats.org/officeDocument/2006/relationships" xmlns:p="http://schemas.openxmlformats.org/presentationml/2006/main">
   <p:cSld>
     <p:spTree>
@@ -4986,7 +5459,7 @@
 </p:sld>
 </file>
 
-<file path=ppt/slides/slide18.xml><?xml version="1.0" encoding="utf-8"?>
+<file path=ppt/slides/slide19.xml><?xml version="1.0" encoding="utf-8"?>
 <p:sld xmlns:a="http://schemas.openxmlformats.org/drawingml/2006/main" xmlns:r="http://schemas.openxmlformats.org/officeDocument/2006/relationships" xmlns:p="http://schemas.openxmlformats.org/presentationml/2006/main">
   <p:cSld>
     <p:spTree>
@@ -5040,103 +5513,6 @@
           <a:xfrm>
             <a:off x="1715135" y="1508125"/>
             <a:ext cx="5714365" cy="4657090"/>
-          </a:xfrm>
-          <a:prstGeom prst="rect">
-            <a:avLst/>
-          </a:prstGeom>
-        </p:spPr>
-      </p:pic>
-    </p:spTree>
-  </p:cSld>
-  <p:clrMapOvr>
-    <a:masterClrMapping/>
-  </p:clrMapOvr>
-</p:sld>
-</file>
-
-<file path=ppt/slides/slide19.xml><?xml version="1.0" encoding="utf-8"?>
-<p:sld xmlns:a="http://schemas.openxmlformats.org/drawingml/2006/main" xmlns:r="http://schemas.openxmlformats.org/officeDocument/2006/relationships" xmlns:p="http://schemas.openxmlformats.org/presentationml/2006/main">
-  <p:cSld>
-    <p:spTree>
-      <p:nvGrpSpPr>
-        <p:cNvPr id="1" name=""/>
-        <p:cNvGrpSpPr/>
-        <p:nvPr/>
-      </p:nvGrpSpPr>
-      <p:grpSpPr/>
-      <p:sp>
-        <p:nvSpPr>
-          <p:cNvPr id="3" name="文本框 2"/>
-          <p:cNvSpPr txBox="1"/>
-          <p:nvPr/>
-        </p:nvSpPr>
-        <p:spPr>
-          <a:xfrm>
-            <a:off x="3226435" y="6229985"/>
-            <a:ext cx="2691130" cy="368300"/>
-          </a:xfrm>
-          <a:prstGeom prst="rect">
-            <a:avLst/>
-          </a:prstGeom>
-          <a:noFill/>
-        </p:spPr>
-        <p:txBody>
-          <a:bodyPr wrap="square" rtlCol="0" anchor="t">
-            <a:spAutoFit/>
-          </a:bodyPr>
-          <a:p>
-            <a:r>
-              <a:rPr lang="zh-CN" altLang="en-US">
-                <a:hlinkClick r:id="rId1" action="ppaction://hlinkfile"/>
-              </a:rPr>
-              <a:t>https://gitee.com/contrast</a:t>
-            </a:r>
-            <a:endParaRPr lang="zh-CN" altLang="en-US"/>
-          </a:p>
-        </p:txBody>
-      </p:sp>
-      <p:pic>
-        <p:nvPicPr>
-          <p:cNvPr id="4" name="图片 3"/>
-          <p:cNvPicPr>
-            <a:picLocks noChangeAspect="1"/>
-          </p:cNvPicPr>
-          <p:nvPr/>
-        </p:nvPicPr>
-        <p:blipFill>
-          <a:blip r:embed="rId2"/>
-          <a:stretch>
-            <a:fillRect/>
-          </a:stretch>
-        </p:blipFill>
-        <p:spPr>
-          <a:xfrm>
-            <a:off x="1052830" y="1839595"/>
-            <a:ext cx="7038340" cy="4390390"/>
-          </a:xfrm>
-          <a:prstGeom prst="rect">
-            <a:avLst/>
-          </a:prstGeom>
-        </p:spPr>
-      </p:pic>
-      <p:pic>
-        <p:nvPicPr>
-          <p:cNvPr id="5" name="图片 4"/>
-          <p:cNvPicPr>
-            <a:picLocks noChangeAspect="1"/>
-          </p:cNvPicPr>
-          <p:nvPr/>
-        </p:nvPicPr>
-        <p:blipFill>
-          <a:blip r:embed="rId3"/>
-          <a:stretch>
-            <a:fillRect/>
-          </a:stretch>
-        </p:blipFill>
-        <p:spPr>
-          <a:xfrm>
-            <a:off x="3458210" y="655320"/>
-            <a:ext cx="2227580" cy="811530"/>
           </a:xfrm>
           <a:prstGeom prst="rect">
             <a:avLst/>
@@ -5275,6 +5651,103 @@
           <a:xfrm>
             <a:off x="5405120" y="4052570"/>
             <a:ext cx="2974340" cy="2555875"/>
+          </a:xfrm>
+          <a:prstGeom prst="rect">
+            <a:avLst/>
+          </a:prstGeom>
+        </p:spPr>
+      </p:pic>
+    </p:spTree>
+  </p:cSld>
+  <p:clrMapOvr>
+    <a:masterClrMapping/>
+  </p:clrMapOvr>
+</p:sld>
+</file>
+
+<file path=ppt/slides/slide20.xml><?xml version="1.0" encoding="utf-8"?>
+<p:sld xmlns:a="http://schemas.openxmlformats.org/drawingml/2006/main" xmlns:r="http://schemas.openxmlformats.org/officeDocument/2006/relationships" xmlns:p="http://schemas.openxmlformats.org/presentationml/2006/main">
+  <p:cSld>
+    <p:spTree>
+      <p:nvGrpSpPr>
+        <p:cNvPr id="1" name=""/>
+        <p:cNvGrpSpPr/>
+        <p:nvPr/>
+      </p:nvGrpSpPr>
+      <p:grpSpPr/>
+      <p:sp>
+        <p:nvSpPr>
+          <p:cNvPr id="3" name="文本框 2"/>
+          <p:cNvSpPr txBox="1"/>
+          <p:nvPr/>
+        </p:nvSpPr>
+        <p:spPr>
+          <a:xfrm>
+            <a:off x="3226435" y="6229985"/>
+            <a:ext cx="2691130" cy="368300"/>
+          </a:xfrm>
+          <a:prstGeom prst="rect">
+            <a:avLst/>
+          </a:prstGeom>
+          <a:noFill/>
+        </p:spPr>
+        <p:txBody>
+          <a:bodyPr wrap="square" rtlCol="0" anchor="t">
+            <a:spAutoFit/>
+          </a:bodyPr>
+          <a:p>
+            <a:r>
+              <a:rPr lang="zh-CN" altLang="en-US">
+                <a:hlinkClick r:id="rId1" action="ppaction://hlinkfile"/>
+              </a:rPr>
+              <a:t>https://gitee.com/contrast</a:t>
+            </a:r>
+            <a:endParaRPr lang="zh-CN" altLang="en-US"/>
+          </a:p>
+        </p:txBody>
+      </p:sp>
+      <p:pic>
+        <p:nvPicPr>
+          <p:cNvPr id="4" name="图片 3"/>
+          <p:cNvPicPr>
+            <a:picLocks noChangeAspect="1"/>
+          </p:cNvPicPr>
+          <p:nvPr/>
+        </p:nvPicPr>
+        <p:blipFill>
+          <a:blip r:embed="rId2"/>
+          <a:stretch>
+            <a:fillRect/>
+          </a:stretch>
+        </p:blipFill>
+        <p:spPr>
+          <a:xfrm>
+            <a:off x="1052830" y="1839595"/>
+            <a:ext cx="7038340" cy="4390390"/>
+          </a:xfrm>
+          <a:prstGeom prst="rect">
+            <a:avLst/>
+          </a:prstGeom>
+        </p:spPr>
+      </p:pic>
+      <p:pic>
+        <p:nvPicPr>
+          <p:cNvPr id="5" name="图片 4"/>
+          <p:cNvPicPr>
+            <a:picLocks noChangeAspect="1"/>
+          </p:cNvPicPr>
+          <p:nvPr/>
+        </p:nvPicPr>
+        <p:blipFill>
+          <a:blip r:embed="rId3"/>
+          <a:stretch>
+            <a:fillRect/>
+          </a:stretch>
+        </p:blipFill>
+        <p:spPr>
+          <a:xfrm>
+            <a:off x="3458210" y="655320"/>
+            <a:ext cx="2227580" cy="811530"/>
           </a:xfrm>
           <a:prstGeom prst="rect">
             <a:avLst/>

</xml_diff>

<commit_message>
Added some version control pictures.
</commit_message>
<xml_diff>
--- a/git/git.pptx
+++ b/git/git.pptx
@@ -3272,16 +3272,16 @@
       </p:sp>
       <p:grpSp>
         <p:nvGrpSpPr>
-          <p:cNvPr id="11" name="组合 10"/>
+          <p:cNvPr id="9" name="组合 8"/>
           <p:cNvGrpSpPr/>
           <p:nvPr/>
         </p:nvGrpSpPr>
         <p:grpSpPr>
           <a:xfrm>
-            <a:off x="3603625" y="3291840"/>
-            <a:ext cx="4585335" cy="2964815"/>
-            <a:chOff x="6371" y="5223"/>
-            <a:chExt cx="6561" cy="4505"/>
+            <a:off x="3383915" y="4882515"/>
+            <a:ext cx="4585970" cy="1405890"/>
+            <a:chOff x="5675" y="5184"/>
+            <a:chExt cx="7222" cy="2214"/>
           </a:xfrm>
         </p:grpSpPr>
         <p:pic>
@@ -3300,8 +3300,8 @@
           </p:blipFill>
           <p:spPr>
             <a:xfrm>
-              <a:off x="6371" y="5223"/>
-              <a:ext cx="2039" cy="2061"/>
+              <a:off x="5675" y="5184"/>
+              <a:ext cx="2244" cy="2136"/>
             </a:xfrm>
             <a:prstGeom prst="rect">
               <a:avLst/>
@@ -3324,8 +3324,8 @@
           </p:blipFill>
           <p:spPr>
             <a:xfrm>
-              <a:off x="8652" y="5242"/>
-              <a:ext cx="1983" cy="2118"/>
+              <a:off x="8185" y="5204"/>
+              <a:ext cx="2182" cy="2195"/>
             </a:xfrm>
             <a:prstGeom prst="rect">
               <a:avLst/>
@@ -3348,14 +3348,29 @@
           </p:blipFill>
           <p:spPr>
             <a:xfrm>
-              <a:off x="10894" y="5260"/>
-              <a:ext cx="2039" cy="2024"/>
+              <a:off x="10653" y="5222"/>
+              <a:ext cx="2244" cy="2098"/>
             </a:xfrm>
             <a:prstGeom prst="rect">
               <a:avLst/>
             </a:prstGeom>
           </p:spPr>
         </p:pic>
+      </p:grpSp>
+      <p:grpSp>
+        <p:nvGrpSpPr>
+          <p:cNvPr id="10" name="组合 9"/>
+          <p:cNvGrpSpPr/>
+          <p:nvPr/>
+        </p:nvGrpSpPr>
+        <p:grpSpPr>
+          <a:xfrm>
+            <a:off x="4064635" y="3340100"/>
+            <a:ext cx="3030220" cy="1405890"/>
+            <a:chOff x="6857" y="7639"/>
+            <a:chExt cx="4772" cy="2214"/>
+          </a:xfrm>
+        </p:grpSpPr>
         <p:pic>
           <p:nvPicPr>
             <p:cNvPr id="7" name="图片 6"/>
@@ -3372,8 +3387,8 @@
           </p:blipFill>
           <p:spPr>
             <a:xfrm>
-              <a:off x="7445" y="7629"/>
-              <a:ext cx="2057" cy="2061"/>
+              <a:off x="6857" y="7678"/>
+              <a:ext cx="2264" cy="2136"/>
             </a:xfrm>
             <a:prstGeom prst="rect">
               <a:avLst/>
@@ -3396,8 +3411,8 @@
           </p:blipFill>
           <p:spPr>
             <a:xfrm>
-              <a:off x="9724" y="7592"/>
-              <a:ext cx="2057" cy="2136"/>
+              <a:off x="9365" y="7639"/>
+              <a:ext cx="2264" cy="2214"/>
             </a:xfrm>
             <a:prstGeom prst="rect">
               <a:avLst/>
@@ -5537,57 +5552,9 @@
         <p:nvPr/>
       </p:nvGrpSpPr>
       <p:grpSpPr/>
-      <p:sp>
-        <p:nvSpPr>
-          <p:cNvPr id="2" name="标题 1"/>
-          <p:cNvSpPr>
-            <a:spLocks noGrp="1"/>
-          </p:cNvSpPr>
-          <p:nvPr>
-            <p:ph type="title"/>
-          </p:nvPr>
-        </p:nvSpPr>
-        <p:spPr/>
-        <p:txBody>
-          <a:bodyPr/>
-          <a:p>
-            <a:r>
-              <a:rPr lang="en-US" altLang="zh-CN"/>
-              <a:t>git</a:t>
-            </a:r>
-            <a:r>
-              <a:rPr lang="zh-CN" altLang="en-US"/>
-              <a:t>简介</a:t>
-            </a:r>
-            <a:endParaRPr lang="zh-CN" altLang="en-US"/>
-          </a:p>
-        </p:txBody>
-      </p:sp>
-      <p:sp>
-        <p:nvSpPr>
-          <p:cNvPr id="3" name="内容占位符 2"/>
-          <p:cNvSpPr>
-            <a:spLocks noGrp="1"/>
-          </p:cNvSpPr>
-          <p:nvPr>
-            <p:ph idx="1"/>
-          </p:nvPr>
-        </p:nvSpPr>
-        <p:spPr/>
-        <p:txBody>
-          <a:bodyPr/>
-          <a:p>
-            <a:r>
-              <a:rPr lang="zh-CN" altLang="en-US"/>
-              <a:t>分布式版本控制系统</a:t>
-            </a:r>
-            <a:endParaRPr lang="zh-CN" altLang="en-US"/>
-          </a:p>
-        </p:txBody>
-      </p:sp>
       <p:pic>
         <p:nvPicPr>
-          <p:cNvPr id="4" name="图片 3" descr="file-rename"/>
+          <p:cNvPr id="8" name="图片 7" descr="2017-09-11 150058"/>
           <p:cNvPicPr>
             <a:picLocks noChangeAspect="1"/>
           </p:cNvPicPr>
@@ -5601,8 +5568,80 @@
         </p:blipFill>
         <p:spPr>
           <a:xfrm>
-            <a:off x="628650" y="2734310"/>
-            <a:ext cx="3733165" cy="2533650"/>
+            <a:off x="5222240" y="2989580"/>
+            <a:ext cx="3243580" cy="3640455"/>
+          </a:xfrm>
+          <a:prstGeom prst="rect">
+            <a:avLst/>
+          </a:prstGeom>
+        </p:spPr>
+      </p:pic>
+      <p:sp>
+        <p:nvSpPr>
+          <p:cNvPr id="2" name="标题 1"/>
+          <p:cNvSpPr>
+            <a:spLocks noGrp="1"/>
+          </p:cNvSpPr>
+          <p:nvPr>
+            <p:ph type="title"/>
+          </p:nvPr>
+        </p:nvSpPr>
+        <p:spPr/>
+        <p:txBody>
+          <a:bodyPr/>
+          <a:p>
+            <a:r>
+              <a:rPr lang="en-US" altLang="zh-CN"/>
+              <a:t>git</a:t>
+            </a:r>
+            <a:r>
+              <a:rPr lang="zh-CN" altLang="en-US"/>
+              <a:t>简介</a:t>
+            </a:r>
+            <a:endParaRPr lang="zh-CN" altLang="en-US"/>
+          </a:p>
+        </p:txBody>
+      </p:sp>
+      <p:sp>
+        <p:nvSpPr>
+          <p:cNvPr id="3" name="内容占位符 2"/>
+          <p:cNvSpPr>
+            <a:spLocks noGrp="1"/>
+          </p:cNvSpPr>
+          <p:nvPr>
+            <p:ph idx="1"/>
+          </p:nvPr>
+        </p:nvSpPr>
+        <p:spPr/>
+        <p:txBody>
+          <a:bodyPr/>
+          <a:p>
+            <a:r>
+              <a:rPr lang="zh-CN" altLang="en-US"/>
+              <a:t>分布式版本控制系统</a:t>
+            </a:r>
+            <a:endParaRPr lang="zh-CN" altLang="en-US"/>
+          </a:p>
+        </p:txBody>
+      </p:sp>
+      <p:pic>
+        <p:nvPicPr>
+          <p:cNvPr id="4" name="图片 3" descr="file-rename"/>
+          <p:cNvPicPr>
+            <a:picLocks noChangeAspect="1"/>
+          </p:cNvPicPr>
+          <p:nvPr/>
+        </p:nvPicPr>
+        <p:blipFill>
+          <a:blip r:embed="rId2"/>
+          <a:stretch>
+            <a:fillRect/>
+          </a:stretch>
+        </p:blipFill>
+        <p:spPr>
+          <a:xfrm>
+            <a:off x="5134610" y="365125"/>
+            <a:ext cx="3063875" cy="2079625"/>
           </a:xfrm>
           <a:prstGeom prst="rect">
             <a:avLst/>
@@ -5618,15 +5657,15 @@
           <p:nvPr/>
         </p:nvPicPr>
         <p:blipFill>
-          <a:blip r:embed="rId2"/>
+          <a:blip r:embed="rId3"/>
           <a:stretch>
             <a:fillRect/>
           </a:stretch>
         </p:blipFill>
         <p:spPr>
           <a:xfrm>
-            <a:off x="5405120" y="1545590"/>
-            <a:ext cx="2963545" cy="2141855"/>
+            <a:off x="628650" y="2662555"/>
+            <a:ext cx="2358390" cy="1704340"/>
           </a:xfrm>
           <a:prstGeom prst="rect">
             <a:avLst/>
@@ -5642,15 +5681,39 @@
           <p:nvPr/>
         </p:nvPicPr>
         <p:blipFill>
-          <a:blip r:embed="rId3"/>
+          <a:blip r:embed="rId4"/>
           <a:stretch>
             <a:fillRect/>
           </a:stretch>
         </p:blipFill>
         <p:spPr>
           <a:xfrm>
-            <a:off x="5405120" y="4052570"/>
-            <a:ext cx="2974340" cy="2555875"/>
+            <a:off x="3780790" y="2737485"/>
+            <a:ext cx="2333625" cy="2005330"/>
+          </a:xfrm>
+          <a:prstGeom prst="rect">
+            <a:avLst/>
+          </a:prstGeom>
+        </p:spPr>
+      </p:pic>
+      <p:pic>
+        <p:nvPicPr>
+          <p:cNvPr id="7" name="图片 6" descr="2017-09-11 150053"/>
+          <p:cNvPicPr>
+            <a:picLocks noChangeAspect="1"/>
+          </p:cNvPicPr>
+          <p:nvPr/>
+        </p:nvPicPr>
+        <p:blipFill>
+          <a:blip r:embed="rId5"/>
+          <a:stretch>
+            <a:fillRect/>
+          </a:stretch>
+        </p:blipFill>
+        <p:spPr>
+          <a:xfrm>
+            <a:off x="628650" y="4742815"/>
+            <a:ext cx="2380615" cy="1875155"/>
           </a:xfrm>
           <a:prstGeom prst="rect">
             <a:avLst/>

</xml_diff>